<commit_message>
Adding lot more to the Report and PPT for Review 1
</commit_message>
<xml_diff>
--- a/PPT-Review-1.pptx
+++ b/PPT-Review-1.pptx
@@ -231,7 +231,7 @@
           <a:p>
             <a:fld id="{71672557-76BA-41F3-80B7-1C8DA4668134}" type="datetimeFigureOut">
               <a:rPr lang="en-US" smtClean="0"/>
-              <a:t>22-Dec-20</a:t>
+              <a:t>1/17/2021</a:t>
             </a:fld>
             <a:endParaRPr lang="en-US" dirty="0"/>
           </a:p>
@@ -400,7 +400,7 @@
           <a:p>
             <a:fld id="{A8ADFD5B-A66C-449C-B6E8-FB716D07777D}" type="datetimeFigureOut">
               <a:rPr lang="en-US" smtClean="0"/>
-              <a:t>22-Dec-20</a:t>
+              <a:t>1/17/2021</a:t>
             </a:fld>
             <a:endParaRPr lang="en-US" dirty="0"/>
           </a:p>
@@ -2757,7 +2757,7 @@
           <a:p>
             <a:fld id="{B63EB09E-62B8-4931-A740-BCE383B263AD}" type="datetime1">
               <a:rPr lang="en-US" smtClean="0"/>
-              <a:t>22-Dec-20</a:t>
+              <a:t>1/17/2021</a:t>
             </a:fld>
             <a:endParaRPr lang="en-US" dirty="0"/>
           </a:p>
@@ -2940,7 +2940,7 @@
                   <a:schemeClr val="tx2"/>
                 </a:solidFill>
               </a:rPr>
-              <a:t>22-Dec-20</a:t>
+              <a:t>1/17/2021</a:t>
             </a:fld>
             <a:endParaRPr lang="en-US" sz="1400" dirty="0">
               <a:solidFill>
@@ -3138,7 +3138,7 @@
                   <a:schemeClr val="tx2"/>
                 </a:solidFill>
               </a:rPr>
-              <a:t>22-Dec-20</a:t>
+              <a:t>1/17/2021</a:t>
             </a:fld>
             <a:endParaRPr lang="en-US" sz="1400" dirty="0">
               <a:solidFill>
@@ -3322,7 +3322,7 @@
           <a:p>
             <a:fld id="{05AD958E-392C-45A5-8B7C-6FFEC23D40D9}" type="datetime1">
               <a:rPr lang="en-US" smtClean="0"/>
-              <a:t>22-Dec-20</a:t>
+              <a:t>1/17/2021</a:t>
             </a:fld>
             <a:endParaRPr lang="en-US" dirty="0"/>
           </a:p>
@@ -3583,7 +3583,7 @@
           <a:p>
             <a:fld id="{F4EF229E-9CC9-445C-B402-B93B63F9A471}" type="datetime1">
               <a:rPr lang="en-US" smtClean="0"/>
-              <a:t>22-Dec-20</a:t>
+              <a:t>1/17/2021</a:t>
             </a:fld>
             <a:endParaRPr lang="en-US" dirty="0"/>
           </a:p>
@@ -3875,7 +3875,7 @@
           <a:p>
             <a:fld id="{45C12418-A1E9-40C6-9BFD-22F174C7C75A}" type="datetime1">
               <a:rPr lang="en-US" smtClean="0"/>
-              <a:t>22-Dec-20</a:t>
+              <a:t>1/17/2021</a:t>
             </a:fld>
             <a:endParaRPr lang="en-US" dirty="0"/>
           </a:p>
@@ -4302,7 +4302,7 @@
           <a:p>
             <a:fld id="{8793B659-6005-4324-A283-1E4ADF604BA5}" type="datetime1">
               <a:rPr lang="en-US" smtClean="0"/>
-              <a:t>22-Dec-20</a:t>
+              <a:t>1/17/2021</a:t>
             </a:fld>
             <a:endParaRPr lang="en-US" dirty="0"/>
           </a:p>
@@ -4422,7 +4422,7 @@
           <a:p>
             <a:fld id="{FB7F26AC-5549-4798-B196-7FC3403A62EA}" type="datetime1">
               <a:rPr lang="en-US" smtClean="0"/>
-              <a:t>22-Dec-20</a:t>
+              <a:t>1/17/2021</a:t>
             </a:fld>
             <a:endParaRPr lang="en-US" dirty="0"/>
           </a:p>
@@ -4523,7 +4523,7 @@
           <a:p>
             <a:fld id="{CB70B857-E226-4E94-98F0-FF856D010F57}" type="datetime1">
               <a:rPr lang="en-US" smtClean="0"/>
-              <a:t>22-Dec-20</a:t>
+              <a:t>1/17/2021</a:t>
             </a:fld>
             <a:endParaRPr lang="en-US" dirty="0"/>
           </a:p>
@@ -4804,7 +4804,7 @@
           <a:p>
             <a:fld id="{50C565FB-884B-42DB-93BA-92C1B703D307}" type="datetime1">
               <a:rPr lang="en-US" smtClean="0"/>
-              <a:t>22-Dec-20</a:t>
+              <a:t>1/17/2021</a:t>
             </a:fld>
             <a:endParaRPr lang="en-US" dirty="0"/>
           </a:p>
@@ -5062,7 +5062,7 @@
           <a:p>
             <a:fld id="{D9DC7979-20C0-4E52-BDB0-0EB42B253591}" type="datetime1">
               <a:rPr lang="en-US" smtClean="0"/>
-              <a:t>22-Dec-20</a:t>
+              <a:t>1/17/2021</a:t>
             </a:fld>
             <a:endParaRPr lang="en-US" dirty="0"/>
           </a:p>
@@ -5280,7 +5280,7 @@
                   <a:schemeClr val="tx2"/>
                 </a:solidFill>
               </a:rPr>
-              <a:t>22-Dec-20</a:t>
+              <a:t>1/17/2021</a:t>
             </a:fld>
             <a:endParaRPr lang="en-US" sz="1400" dirty="0">
               <a:solidFill>
@@ -5694,6 +5694,14 @@
           </a:bodyPr>
           <a:lstStyle/>
           <a:p>
+            <a:r>
+              <a:rPr lang="en-IN" sz="2400" b="1" dirty="0">
+                <a:solidFill>
+                  <a:srgbClr val="0070C0"/>
+                </a:solidFill>
+              </a:rPr>
+              <a:t/>
+            </a:r>
             <a:br>
               <a:rPr lang="en-IN" sz="2400" b="1" dirty="0">
                 <a:solidFill>
@@ -5701,6 +5709,14 @@
                 </a:solidFill>
               </a:rPr>
             </a:br>
+            <a:r>
+              <a:rPr lang="en-IN" sz="2400" b="1" dirty="0">
+                <a:solidFill>
+                  <a:srgbClr val="0070C0"/>
+                </a:solidFill>
+              </a:rPr>
+              <a:t/>
+            </a:r>
             <a:br>
               <a:rPr lang="en-IN" sz="2400" b="1" dirty="0">
                 <a:solidFill>
@@ -5718,6 +5734,13 @@
               </a:rPr>
               <a:t>VEMANA INSTITUTE OF TECHNOLOGY</a:t>
             </a:r>
+            <a:r>
+              <a:rPr lang="en-IN" sz="2000" b="1" dirty="0">
+                <a:latin typeface="Times New Roman" panose="02020603050405020304" pitchFamily="18" charset="0"/>
+                <a:cs typeface="Times New Roman" panose="02020603050405020304" pitchFamily="18" charset="0"/>
+              </a:rPr>
+              <a:t/>
+            </a:r>
             <a:br>
               <a:rPr lang="en-IN" sz="2000" b="1" dirty="0">
                 <a:latin typeface="Times New Roman" panose="02020603050405020304" pitchFamily="18" charset="0"/>
@@ -5731,6 +5754,13 @@
               </a:rPr>
               <a:t>Koramangala, Bengaluru-34.</a:t>
             </a:r>
+            <a:r>
+              <a:rPr lang="en-IN" sz="2000" b="1" dirty="0">
+                <a:latin typeface="Times New Roman" panose="02020603050405020304" pitchFamily="18" charset="0"/>
+                <a:cs typeface="Times New Roman" panose="02020603050405020304" pitchFamily="18" charset="0"/>
+              </a:rPr>
+              <a:t/>
+            </a:r>
             <a:br>
               <a:rPr lang="en-IN" sz="2000" b="1" dirty="0">
                 <a:latin typeface="Times New Roman" panose="02020603050405020304" pitchFamily="18" charset="0"/>
@@ -5747,6 +5777,13 @@
               </a:rPr>
               <a:t>Department of Computer Science and Engineering</a:t>
             </a:r>
+            <a:r>
+              <a:rPr lang="en-US" sz="2400" b="1" dirty="0">
+                <a:latin typeface="Times New Roman" panose="02020603050405020304" pitchFamily="18" charset="0"/>
+                <a:cs typeface="Times New Roman" panose="02020603050405020304" pitchFamily="18" charset="0"/>
+              </a:rPr>
+              <a:t/>
+            </a:r>
             <a:br>
               <a:rPr lang="en-US" sz="2400" b="1" dirty="0">
                 <a:latin typeface="Times New Roman" panose="02020603050405020304" pitchFamily="18" charset="0"/>
@@ -5779,6 +5816,10 @@
                 <a:cs typeface="Times New Roman" panose="02020603050405020304" pitchFamily="18" charset="0"/>
               </a:rPr>
               <a:t> </a:t>
+            </a:r>
+            <a:r>
+              <a:rPr lang="en-US" sz="2400" dirty="0"/>
+              <a:t/>
             </a:r>
             <a:br>
               <a:rPr lang="en-US" sz="2400" dirty="0"/>
@@ -5976,7 +6017,7 @@
           <p:cNvPr id="7" name="Rectangle 4">
             <a:extLst>
               <a:ext uri="{FF2B5EF4-FFF2-40B4-BE49-F238E27FC236}">
-                <a16:creationId xmlns:a16="http://schemas.microsoft.com/office/drawing/2014/main" id="{F998D05D-670E-4B4F-A80C-633BEB8F8FE1}"/>
+                <a16:creationId xmlns:a16="http://schemas.microsoft.com/office/drawing/2014/main" xmlns="" id="{F998D05D-670E-4B4F-A80C-633BEB8F8FE1}"/>
               </a:ext>
             </a:extLst>
           </p:cNvPr>
@@ -6091,7 +6132,7 @@
           <a:p>
             <a:fld id="{CB70B857-E226-4E94-98F0-FF856D010F57}" type="datetime1">
               <a:rPr lang="en-US" smtClean="0"/>
-              <a:t>22-Dec-20</a:t>
+              <a:t>1/17/2021</a:t>
             </a:fld>
             <a:endParaRPr lang="en-US" dirty="0"/>
           </a:p>
@@ -6236,7 +6277,7 @@
           <p:cNvPr id="6" name="Date Placeholder 3">
             <a:extLst>
               <a:ext uri="{FF2B5EF4-FFF2-40B4-BE49-F238E27FC236}">
-                <a16:creationId xmlns:a16="http://schemas.microsoft.com/office/drawing/2014/main" id="{54B6F2D0-7DB8-46A8-BE38-9A76D2B8158B}"/>
+                <a16:creationId xmlns:a16="http://schemas.microsoft.com/office/drawing/2014/main" xmlns="" id="{54B6F2D0-7DB8-46A8-BE38-9A76D2B8158B}"/>
               </a:ext>
             </a:extLst>
           </p:cNvPr>
@@ -6364,7 +6405,7 @@
           <p:cNvPr id="7" name="Date Placeholder 3">
             <a:extLst>
               <a:ext uri="{FF2B5EF4-FFF2-40B4-BE49-F238E27FC236}">
-                <a16:creationId xmlns:a16="http://schemas.microsoft.com/office/drawing/2014/main" id="{7776AD0D-19A8-414D-80CE-F20CD3193C15}"/>
+                <a16:creationId xmlns:a16="http://schemas.microsoft.com/office/drawing/2014/main" xmlns="" id="{7776AD0D-19A8-414D-80CE-F20CD3193C15}"/>
               </a:ext>
             </a:extLst>
           </p:cNvPr>
@@ -6489,7 +6530,7 @@
           <p:cNvPr id="8" name="Title 1">
             <a:extLst>
               <a:ext uri="{FF2B5EF4-FFF2-40B4-BE49-F238E27FC236}">
-                <a16:creationId xmlns:a16="http://schemas.microsoft.com/office/drawing/2014/main" id="{DC85129E-0B0B-4C64-B8AF-D549982166EC}"/>
+                <a16:creationId xmlns:a16="http://schemas.microsoft.com/office/drawing/2014/main" xmlns="" id="{DC85129E-0B0B-4C64-B8AF-D549982166EC}"/>
               </a:ext>
             </a:extLst>
           </p:cNvPr>
@@ -6832,7 +6873,7 @@
           <p:cNvPr id="11" name="Title 1">
             <a:extLst>
               <a:ext uri="{FF2B5EF4-FFF2-40B4-BE49-F238E27FC236}">
-                <a16:creationId xmlns:a16="http://schemas.microsoft.com/office/drawing/2014/main" id="{DC85129E-0B0B-4C64-B8AF-D549982166EC}"/>
+                <a16:creationId xmlns:a16="http://schemas.microsoft.com/office/drawing/2014/main" xmlns="" id="{DC85129E-0B0B-4C64-B8AF-D549982166EC}"/>
               </a:ext>
             </a:extLst>
           </p:cNvPr>
@@ -6881,7 +6922,7 @@
           <p:cNvPr id="13" name="Footer Placeholder 4">
             <a:extLst>
               <a:ext uri="{FF2B5EF4-FFF2-40B4-BE49-F238E27FC236}">
-                <a16:creationId xmlns:a16="http://schemas.microsoft.com/office/drawing/2014/main" id="{D1ABF561-8E91-4704-BDD7-0520E3848081}"/>
+                <a16:creationId xmlns:a16="http://schemas.microsoft.com/office/drawing/2014/main" xmlns="" id="{D1ABF561-8E91-4704-BDD7-0520E3848081}"/>
               </a:ext>
             </a:extLst>
           </p:cNvPr>
@@ -6919,7 +6960,7 @@
           <p:cNvPr id="12" name="Date Placeholder 3">
             <a:extLst>
               <a:ext uri="{FF2B5EF4-FFF2-40B4-BE49-F238E27FC236}">
-                <a16:creationId xmlns:a16="http://schemas.microsoft.com/office/drawing/2014/main" id="{54B6F2D0-7DB8-46A8-BE38-9A76D2B8158B}"/>
+                <a16:creationId xmlns:a16="http://schemas.microsoft.com/office/drawing/2014/main" xmlns="" id="{54B6F2D0-7DB8-46A8-BE38-9A76D2B8158B}"/>
               </a:ext>
             </a:extLst>
           </p:cNvPr>
@@ -7047,7 +7088,7 @@
           <p:cNvPr id="15" name="Date Placeholder 3">
             <a:extLst>
               <a:ext uri="{FF2B5EF4-FFF2-40B4-BE49-F238E27FC236}">
-                <a16:creationId xmlns:a16="http://schemas.microsoft.com/office/drawing/2014/main" id="{7776AD0D-19A8-414D-80CE-F20CD3193C15}"/>
+                <a16:creationId xmlns:a16="http://schemas.microsoft.com/office/drawing/2014/main" xmlns="" id="{7776AD0D-19A8-414D-80CE-F20CD3193C15}"/>
               </a:ext>
             </a:extLst>
           </p:cNvPr>
@@ -7172,7 +7213,7 @@
           <p:cNvPr id="16" name="Date Placeholder 3">
             <a:extLst>
               <a:ext uri="{FF2B5EF4-FFF2-40B4-BE49-F238E27FC236}">
-                <a16:creationId xmlns:a16="http://schemas.microsoft.com/office/drawing/2014/main" id="{2135CCC7-8B9E-459F-BB5B-78E5BAC4A86B}"/>
+                <a16:creationId xmlns:a16="http://schemas.microsoft.com/office/drawing/2014/main" xmlns="" id="{2135CCC7-8B9E-459F-BB5B-78E5BAC4A86B}"/>
               </a:ext>
             </a:extLst>
           </p:cNvPr>
@@ -7207,7 +7248,7 @@
           <p:cNvPr id="14" name="Table 4">
             <a:extLst>
               <a:ext uri="{FF2B5EF4-FFF2-40B4-BE49-F238E27FC236}">
-                <a16:creationId xmlns:a16="http://schemas.microsoft.com/office/drawing/2014/main" id="{0A3DE33F-D3A3-4E45-9846-4938B2376458}"/>
+                <a16:creationId xmlns:a16="http://schemas.microsoft.com/office/drawing/2014/main" xmlns="" id="{0A3DE33F-D3A3-4E45-9846-4938B2376458}"/>
               </a:ext>
             </a:extLst>
           </p:cNvPr>
@@ -7217,14 +7258,14 @@
           <p:nvPr>
             <p:extLst>
               <p:ext uri="{D42A27DB-BD31-4B8C-83A1-F6EECF244321}">
-                <p14:modId xmlns:p14="http://schemas.microsoft.com/office/powerpoint/2010/main" val="871390812"/>
+                <p14:modId xmlns:p14="http://schemas.microsoft.com/office/powerpoint/2010/main" val="387910538"/>
               </p:ext>
             </p:extLst>
           </p:nvPr>
         </p:nvGraphicFramePr>
         <p:xfrm>
-          <a:off x="102000" y="930415"/>
-          <a:ext cx="8889600" cy="3809999"/>
+          <a:off x="102000" y="907421"/>
+          <a:ext cx="8889600" cy="3832994"/>
         </p:xfrm>
         <a:graphic>
           <a:graphicData uri="http://schemas.openxmlformats.org/drawingml/2006/table">
@@ -7236,33 +7277,33 @@
                 <a:gridCol w="1242866">
                   <a:extLst>
                     <a:ext uri="{9D8B030D-6E8A-4147-A177-3AD203B41FA5}">
-                      <a16:colId xmlns:a16="http://schemas.microsoft.com/office/drawing/2014/main" val="1878398145"/>
+                      <a16:colId xmlns:a16="http://schemas.microsoft.com/office/drawing/2014/main" xmlns="" val="1878398145"/>
                     </a:ext>
                   </a:extLst>
                 </a:gridCol>
                 <a:gridCol w="1805134">
                   <a:extLst>
                     <a:ext uri="{9D8B030D-6E8A-4147-A177-3AD203B41FA5}">
-                      <a16:colId xmlns:a16="http://schemas.microsoft.com/office/drawing/2014/main" val="3316006825"/>
+                      <a16:colId xmlns:a16="http://schemas.microsoft.com/office/drawing/2014/main" xmlns="" val="3316006825"/>
                     </a:ext>
                   </a:extLst>
                 </a:gridCol>
                 <a:gridCol w="2946000">
                   <a:extLst>
                     <a:ext uri="{9D8B030D-6E8A-4147-A177-3AD203B41FA5}">
-                      <a16:colId xmlns:a16="http://schemas.microsoft.com/office/drawing/2014/main" val="329433535"/>
+                      <a16:colId xmlns:a16="http://schemas.microsoft.com/office/drawing/2014/main" xmlns="" val="329433535"/>
                     </a:ext>
                   </a:extLst>
                 </a:gridCol>
                 <a:gridCol w="2895600">
                   <a:extLst>
                     <a:ext uri="{9D8B030D-6E8A-4147-A177-3AD203B41FA5}">
-                      <a16:colId xmlns:a16="http://schemas.microsoft.com/office/drawing/2014/main" val="3976692249"/>
+                      <a16:colId xmlns:a16="http://schemas.microsoft.com/office/drawing/2014/main" xmlns="" val="3976692249"/>
                     </a:ext>
                   </a:extLst>
                 </a:gridCol>
               </a:tblGrid>
-              <a:tr h="907143">
+              <a:tr h="912618">
                 <a:tc>
                   <a:txBody>
                     <a:bodyPr/>
@@ -7362,11 +7403,11 @@
                 </a:tc>
                 <a:extLst>
                   <a:ext uri="{0D108BD9-81ED-4DB2-BD59-A6C34878D82A}">
-                    <a16:rowId xmlns:a16="http://schemas.microsoft.com/office/drawing/2014/main" val="184728700"/>
+                    <a16:rowId xmlns:a16="http://schemas.microsoft.com/office/drawing/2014/main" xmlns="" val="184728700"/>
                   </a:ext>
                 </a:extLst>
               </a:tr>
-              <a:tr h="725714">
+              <a:tr h="730094">
                 <a:tc>
                   <a:txBody>
                     <a:bodyPr/>
@@ -7441,11 +7482,11 @@
                 </a:tc>
                 <a:extLst>
                   <a:ext uri="{0D108BD9-81ED-4DB2-BD59-A6C34878D82A}">
-                    <a16:rowId xmlns:a16="http://schemas.microsoft.com/office/drawing/2014/main" val="2296912271"/>
+                    <a16:rowId xmlns:a16="http://schemas.microsoft.com/office/drawing/2014/main" xmlns="" val="2296912271"/>
                   </a:ext>
                 </a:extLst>
               </a:tr>
-              <a:tr h="725714">
+              <a:tr h="730094">
                 <a:tc>
                   <a:txBody>
                     <a:bodyPr/>
@@ -7520,11 +7561,11 @@
                 </a:tc>
                 <a:extLst>
                   <a:ext uri="{0D108BD9-81ED-4DB2-BD59-A6C34878D82A}">
-                    <a16:rowId xmlns:a16="http://schemas.microsoft.com/office/drawing/2014/main" val="74190426"/>
+                    <a16:rowId xmlns:a16="http://schemas.microsoft.com/office/drawing/2014/main" xmlns="" val="74190426"/>
                   </a:ext>
                 </a:extLst>
               </a:tr>
-              <a:tr h="725714">
+              <a:tr h="730094">
                 <a:tc>
                   <a:txBody>
                     <a:bodyPr/>
@@ -7599,11 +7640,11 @@
                 </a:tc>
                 <a:extLst>
                   <a:ext uri="{0D108BD9-81ED-4DB2-BD59-A6C34878D82A}">
-                    <a16:rowId xmlns:a16="http://schemas.microsoft.com/office/drawing/2014/main" val="2716787316"/>
+                    <a16:rowId xmlns:a16="http://schemas.microsoft.com/office/drawing/2014/main" xmlns="" val="2716787316"/>
                   </a:ext>
                 </a:extLst>
               </a:tr>
-              <a:tr h="725714">
+              <a:tr h="730094">
                 <a:tc>
                   <a:txBody>
                     <a:bodyPr/>
@@ -7678,7 +7719,7 @@
                 </a:tc>
                 <a:extLst>
                   <a:ext uri="{0D108BD9-81ED-4DB2-BD59-A6C34878D82A}">
-                    <a16:rowId xmlns:a16="http://schemas.microsoft.com/office/drawing/2014/main" val="1290870815"/>
+                    <a16:rowId xmlns:a16="http://schemas.microsoft.com/office/drawing/2014/main" xmlns="" val="1290870815"/>
                   </a:ext>
                 </a:extLst>
               </a:tr>
@@ -8082,7 +8123,7 @@
           <p:cNvPr id="11" name="Title 1">
             <a:extLst>
               <a:ext uri="{FF2B5EF4-FFF2-40B4-BE49-F238E27FC236}">
-                <a16:creationId xmlns:a16="http://schemas.microsoft.com/office/drawing/2014/main" id="{DC85129E-0B0B-4C64-B8AF-D549982166EC}"/>
+                <a16:creationId xmlns:a16="http://schemas.microsoft.com/office/drawing/2014/main" xmlns="" id="{DC85129E-0B0B-4C64-B8AF-D549982166EC}"/>
               </a:ext>
             </a:extLst>
           </p:cNvPr>
@@ -8131,7 +8172,7 @@
           <p:cNvPr id="13" name="Footer Placeholder 4">
             <a:extLst>
               <a:ext uri="{FF2B5EF4-FFF2-40B4-BE49-F238E27FC236}">
-                <a16:creationId xmlns:a16="http://schemas.microsoft.com/office/drawing/2014/main" id="{D1ABF561-8E91-4704-BDD7-0520E3848081}"/>
+                <a16:creationId xmlns:a16="http://schemas.microsoft.com/office/drawing/2014/main" xmlns="" id="{D1ABF561-8E91-4704-BDD7-0520E3848081}"/>
               </a:ext>
             </a:extLst>
           </p:cNvPr>
@@ -8169,7 +8210,7 @@
           <p:cNvPr id="12" name="Date Placeholder 3">
             <a:extLst>
               <a:ext uri="{FF2B5EF4-FFF2-40B4-BE49-F238E27FC236}">
-                <a16:creationId xmlns:a16="http://schemas.microsoft.com/office/drawing/2014/main" id="{176EA1C9-E23B-48AB-8281-D2D5849F059E}"/>
+                <a16:creationId xmlns:a16="http://schemas.microsoft.com/office/drawing/2014/main" xmlns="" id="{176EA1C9-E23B-48AB-8281-D2D5849F059E}"/>
               </a:ext>
             </a:extLst>
           </p:cNvPr>
@@ -8297,7 +8338,7 @@
           <p:cNvPr id="14" name="Date Placeholder 3">
             <a:extLst>
               <a:ext uri="{FF2B5EF4-FFF2-40B4-BE49-F238E27FC236}">
-                <a16:creationId xmlns:a16="http://schemas.microsoft.com/office/drawing/2014/main" id="{89B01AFC-C763-4360-A0DF-36623F26E639}"/>
+                <a16:creationId xmlns:a16="http://schemas.microsoft.com/office/drawing/2014/main" xmlns="" id="{89B01AFC-C763-4360-A0DF-36623F26E639}"/>
               </a:ext>
             </a:extLst>
           </p:cNvPr>
@@ -8422,7 +8463,7 @@
           <p:cNvPr id="16" name="Date Placeholder 3">
             <a:extLst>
               <a:ext uri="{FF2B5EF4-FFF2-40B4-BE49-F238E27FC236}">
-                <a16:creationId xmlns:a16="http://schemas.microsoft.com/office/drawing/2014/main" id="{57EFB148-FA92-4E16-96EF-077DDA9F085C}"/>
+                <a16:creationId xmlns:a16="http://schemas.microsoft.com/office/drawing/2014/main" xmlns="" id="{57EFB148-FA92-4E16-96EF-077DDA9F085C}"/>
               </a:ext>
             </a:extLst>
           </p:cNvPr>
@@ -8770,7 +8811,7 @@
           <p:cNvPr id="5" name="Title 1">
             <a:extLst>
               <a:ext uri="{FF2B5EF4-FFF2-40B4-BE49-F238E27FC236}">
-                <a16:creationId xmlns:a16="http://schemas.microsoft.com/office/drawing/2014/main" id="{A74DC265-B8A4-4A7D-BEC5-49C9BE7CEF86}"/>
+                <a16:creationId xmlns:a16="http://schemas.microsoft.com/office/drawing/2014/main" xmlns="" id="{A74DC265-B8A4-4A7D-BEC5-49C9BE7CEF86}"/>
               </a:ext>
             </a:extLst>
           </p:cNvPr>
@@ -8850,7 +8891,7 @@
           <p:cNvPr id="6" name="Date Placeholder 3">
             <a:extLst>
               <a:ext uri="{FF2B5EF4-FFF2-40B4-BE49-F238E27FC236}">
-                <a16:creationId xmlns:a16="http://schemas.microsoft.com/office/drawing/2014/main" id="{BFC0A1CF-FBD8-4A20-A86C-D1807533684B}"/>
+                <a16:creationId xmlns:a16="http://schemas.microsoft.com/office/drawing/2014/main" xmlns="" id="{BFC0A1CF-FBD8-4A20-A86C-D1807533684B}"/>
               </a:ext>
             </a:extLst>
           </p:cNvPr>
@@ -8978,7 +9019,7 @@
           <p:cNvPr id="7" name="Date Placeholder 3">
             <a:extLst>
               <a:ext uri="{FF2B5EF4-FFF2-40B4-BE49-F238E27FC236}">
-                <a16:creationId xmlns:a16="http://schemas.microsoft.com/office/drawing/2014/main" id="{69660009-3E78-4D1D-BB08-A7F5ED37371F}"/>
+                <a16:creationId xmlns:a16="http://schemas.microsoft.com/office/drawing/2014/main" xmlns="" id="{69660009-3E78-4D1D-BB08-A7F5ED37371F}"/>
               </a:ext>
             </a:extLst>
           </p:cNvPr>
@@ -9103,7 +9144,7 @@
           <p:cNvPr id="8" name="Footer Placeholder 4">
             <a:extLst>
               <a:ext uri="{FF2B5EF4-FFF2-40B4-BE49-F238E27FC236}">
-                <a16:creationId xmlns:a16="http://schemas.microsoft.com/office/drawing/2014/main" id="{E640B1D3-DB4D-447F-889D-5CB363790BEB}"/>
+                <a16:creationId xmlns:a16="http://schemas.microsoft.com/office/drawing/2014/main" xmlns="" id="{E640B1D3-DB4D-447F-889D-5CB363790BEB}"/>
               </a:ext>
             </a:extLst>
           </p:cNvPr>
@@ -9233,7 +9274,7 @@
           <p:cNvPr id="9" name="Footer Placeholder 4">
             <a:extLst>
               <a:ext uri="{FF2B5EF4-FFF2-40B4-BE49-F238E27FC236}">
-                <a16:creationId xmlns:a16="http://schemas.microsoft.com/office/drawing/2014/main" id="{BE0FBA02-D135-4772-ACBA-E7E8BCBACD32}"/>
+                <a16:creationId xmlns:a16="http://schemas.microsoft.com/office/drawing/2014/main" xmlns="" id="{BE0FBA02-D135-4772-ACBA-E7E8BCBACD32}"/>
               </a:ext>
             </a:extLst>
           </p:cNvPr>
@@ -9271,7 +9312,7 @@
           <p:cNvPr id="10" name="Date Placeholder 3">
             <a:extLst>
               <a:ext uri="{FF2B5EF4-FFF2-40B4-BE49-F238E27FC236}">
-                <a16:creationId xmlns:a16="http://schemas.microsoft.com/office/drawing/2014/main" id="{F0B97C1B-B3EB-4954-80E0-AE835375B239}"/>
+                <a16:creationId xmlns:a16="http://schemas.microsoft.com/office/drawing/2014/main" xmlns="" id="{F0B97C1B-B3EB-4954-80E0-AE835375B239}"/>
               </a:ext>
             </a:extLst>
           </p:cNvPr>
@@ -9575,7 +9616,7 @@
           <p:cNvPr id="11" name="Title 1">
             <a:extLst>
               <a:ext uri="{FF2B5EF4-FFF2-40B4-BE49-F238E27FC236}">
-                <a16:creationId xmlns:a16="http://schemas.microsoft.com/office/drawing/2014/main" id="{DC85129E-0B0B-4C64-B8AF-D549982166EC}"/>
+                <a16:creationId xmlns:a16="http://schemas.microsoft.com/office/drawing/2014/main" xmlns="" id="{DC85129E-0B0B-4C64-B8AF-D549982166EC}"/>
               </a:ext>
             </a:extLst>
           </p:cNvPr>
@@ -9624,7 +9665,7 @@
           <p:cNvPr id="13" name="Footer Placeholder 4">
             <a:extLst>
               <a:ext uri="{FF2B5EF4-FFF2-40B4-BE49-F238E27FC236}">
-                <a16:creationId xmlns:a16="http://schemas.microsoft.com/office/drawing/2014/main" id="{D1ABF561-8E91-4704-BDD7-0520E3848081}"/>
+                <a16:creationId xmlns:a16="http://schemas.microsoft.com/office/drawing/2014/main" xmlns="" id="{D1ABF561-8E91-4704-BDD7-0520E3848081}"/>
               </a:ext>
             </a:extLst>
           </p:cNvPr>
@@ -9662,7 +9703,7 @@
           <p:cNvPr id="12" name="Date Placeholder 3">
             <a:extLst>
               <a:ext uri="{FF2B5EF4-FFF2-40B4-BE49-F238E27FC236}">
-                <a16:creationId xmlns:a16="http://schemas.microsoft.com/office/drawing/2014/main" id="{E04BECF4-D289-4A42-A4A2-7BC21939DA2C}"/>
+                <a16:creationId xmlns:a16="http://schemas.microsoft.com/office/drawing/2014/main" xmlns="" id="{E04BECF4-D289-4A42-A4A2-7BC21939DA2C}"/>
               </a:ext>
             </a:extLst>
           </p:cNvPr>
@@ -9790,7 +9831,7 @@
           <p:cNvPr id="14" name="Date Placeholder 3">
             <a:extLst>
               <a:ext uri="{FF2B5EF4-FFF2-40B4-BE49-F238E27FC236}">
-                <a16:creationId xmlns:a16="http://schemas.microsoft.com/office/drawing/2014/main" id="{35BBAE87-9803-4BD6-A198-A343222DB1E0}"/>
+                <a16:creationId xmlns:a16="http://schemas.microsoft.com/office/drawing/2014/main" xmlns="" id="{35BBAE87-9803-4BD6-A198-A343222DB1E0}"/>
               </a:ext>
             </a:extLst>
           </p:cNvPr>
@@ -9915,7 +9956,7 @@
           <p:cNvPr id="16" name="Date Placeholder 3">
             <a:extLst>
               <a:ext uri="{FF2B5EF4-FFF2-40B4-BE49-F238E27FC236}">
-                <a16:creationId xmlns:a16="http://schemas.microsoft.com/office/drawing/2014/main" id="{FF045313-70BA-489A-9807-A4F538B558CF}"/>
+                <a16:creationId xmlns:a16="http://schemas.microsoft.com/office/drawing/2014/main" xmlns="" id="{FF045313-70BA-489A-9807-A4F538B558CF}"/>
               </a:ext>
             </a:extLst>
           </p:cNvPr>
@@ -10226,7 +10267,7 @@
           <p:cNvPr id="11" name="Title 1">
             <a:extLst>
               <a:ext uri="{FF2B5EF4-FFF2-40B4-BE49-F238E27FC236}">
-                <a16:creationId xmlns:a16="http://schemas.microsoft.com/office/drawing/2014/main" id="{DC85129E-0B0B-4C64-B8AF-D549982166EC}"/>
+                <a16:creationId xmlns:a16="http://schemas.microsoft.com/office/drawing/2014/main" xmlns="" id="{DC85129E-0B0B-4C64-B8AF-D549982166EC}"/>
               </a:ext>
             </a:extLst>
           </p:cNvPr>
@@ -10275,7 +10316,7 @@
           <p:cNvPr id="13" name="Footer Placeholder 4">
             <a:extLst>
               <a:ext uri="{FF2B5EF4-FFF2-40B4-BE49-F238E27FC236}">
-                <a16:creationId xmlns:a16="http://schemas.microsoft.com/office/drawing/2014/main" id="{D1ABF561-8E91-4704-BDD7-0520E3848081}"/>
+                <a16:creationId xmlns:a16="http://schemas.microsoft.com/office/drawing/2014/main" xmlns="" id="{D1ABF561-8E91-4704-BDD7-0520E3848081}"/>
               </a:ext>
             </a:extLst>
           </p:cNvPr>
@@ -10313,7 +10354,7 @@
           <p:cNvPr id="12" name="Date Placeholder 3">
             <a:extLst>
               <a:ext uri="{FF2B5EF4-FFF2-40B4-BE49-F238E27FC236}">
-                <a16:creationId xmlns:a16="http://schemas.microsoft.com/office/drawing/2014/main" id="{E04BECF4-D289-4A42-A4A2-7BC21939DA2C}"/>
+                <a16:creationId xmlns:a16="http://schemas.microsoft.com/office/drawing/2014/main" xmlns="" id="{E04BECF4-D289-4A42-A4A2-7BC21939DA2C}"/>
               </a:ext>
             </a:extLst>
           </p:cNvPr>
@@ -10441,7 +10482,7 @@
           <p:cNvPr id="14" name="Date Placeholder 3">
             <a:extLst>
               <a:ext uri="{FF2B5EF4-FFF2-40B4-BE49-F238E27FC236}">
-                <a16:creationId xmlns:a16="http://schemas.microsoft.com/office/drawing/2014/main" id="{35BBAE87-9803-4BD6-A198-A343222DB1E0}"/>
+                <a16:creationId xmlns:a16="http://schemas.microsoft.com/office/drawing/2014/main" xmlns="" id="{35BBAE87-9803-4BD6-A198-A343222DB1E0}"/>
               </a:ext>
             </a:extLst>
           </p:cNvPr>
@@ -10566,7 +10607,7 @@
           <p:cNvPr id="16" name="Date Placeholder 3">
             <a:extLst>
               <a:ext uri="{FF2B5EF4-FFF2-40B4-BE49-F238E27FC236}">
-                <a16:creationId xmlns:a16="http://schemas.microsoft.com/office/drawing/2014/main" id="{FF045313-70BA-489A-9807-A4F538B558CF}"/>
+                <a16:creationId xmlns:a16="http://schemas.microsoft.com/office/drawing/2014/main" xmlns="" id="{FF045313-70BA-489A-9807-A4F538B558CF}"/>
               </a:ext>
             </a:extLst>
           </p:cNvPr>
@@ -11113,7 +11154,7 @@
           <p:cNvPr id="11" name="Title 1">
             <a:extLst>
               <a:ext uri="{FF2B5EF4-FFF2-40B4-BE49-F238E27FC236}">
-                <a16:creationId xmlns:a16="http://schemas.microsoft.com/office/drawing/2014/main" id="{DC85129E-0B0B-4C64-B8AF-D549982166EC}"/>
+                <a16:creationId xmlns:a16="http://schemas.microsoft.com/office/drawing/2014/main" xmlns="" id="{DC85129E-0B0B-4C64-B8AF-D549982166EC}"/>
               </a:ext>
             </a:extLst>
           </p:cNvPr>
@@ -11162,7 +11203,7 @@
           <p:cNvPr id="13" name="Footer Placeholder 4">
             <a:extLst>
               <a:ext uri="{FF2B5EF4-FFF2-40B4-BE49-F238E27FC236}">
-                <a16:creationId xmlns:a16="http://schemas.microsoft.com/office/drawing/2014/main" id="{D1ABF561-8E91-4704-BDD7-0520E3848081}"/>
+                <a16:creationId xmlns:a16="http://schemas.microsoft.com/office/drawing/2014/main" xmlns="" id="{D1ABF561-8E91-4704-BDD7-0520E3848081}"/>
               </a:ext>
             </a:extLst>
           </p:cNvPr>
@@ -11200,7 +11241,7 @@
           <p:cNvPr id="12" name="Date Placeholder 3">
             <a:extLst>
               <a:ext uri="{FF2B5EF4-FFF2-40B4-BE49-F238E27FC236}">
-                <a16:creationId xmlns:a16="http://schemas.microsoft.com/office/drawing/2014/main" id="{E04BECF4-D289-4A42-A4A2-7BC21939DA2C}"/>
+                <a16:creationId xmlns:a16="http://schemas.microsoft.com/office/drawing/2014/main" xmlns="" id="{E04BECF4-D289-4A42-A4A2-7BC21939DA2C}"/>
               </a:ext>
             </a:extLst>
           </p:cNvPr>
@@ -11328,7 +11369,7 @@
           <p:cNvPr id="14" name="Date Placeholder 3">
             <a:extLst>
               <a:ext uri="{FF2B5EF4-FFF2-40B4-BE49-F238E27FC236}">
-                <a16:creationId xmlns:a16="http://schemas.microsoft.com/office/drawing/2014/main" id="{35BBAE87-9803-4BD6-A198-A343222DB1E0}"/>
+                <a16:creationId xmlns:a16="http://schemas.microsoft.com/office/drawing/2014/main" xmlns="" id="{35BBAE87-9803-4BD6-A198-A343222DB1E0}"/>
               </a:ext>
             </a:extLst>
           </p:cNvPr>
@@ -11453,7 +11494,7 @@
           <p:cNvPr id="16" name="Date Placeholder 3">
             <a:extLst>
               <a:ext uri="{FF2B5EF4-FFF2-40B4-BE49-F238E27FC236}">
-                <a16:creationId xmlns:a16="http://schemas.microsoft.com/office/drawing/2014/main" id="{FF045313-70BA-489A-9807-A4F538B558CF}"/>
+                <a16:creationId xmlns:a16="http://schemas.microsoft.com/office/drawing/2014/main" xmlns="" id="{FF045313-70BA-489A-9807-A4F538B558CF}"/>
               </a:ext>
             </a:extLst>
           </p:cNvPr>
@@ -11630,7 +11671,7 @@
           <p:cNvPr id="11" name="Title 1">
             <a:extLst>
               <a:ext uri="{FF2B5EF4-FFF2-40B4-BE49-F238E27FC236}">
-                <a16:creationId xmlns:a16="http://schemas.microsoft.com/office/drawing/2014/main" id="{DC85129E-0B0B-4C64-B8AF-D549982166EC}"/>
+                <a16:creationId xmlns:a16="http://schemas.microsoft.com/office/drawing/2014/main" xmlns="" id="{DC85129E-0B0B-4C64-B8AF-D549982166EC}"/>
               </a:ext>
             </a:extLst>
           </p:cNvPr>
@@ -11679,7 +11720,7 @@
           <p:cNvPr id="13" name="Footer Placeholder 4">
             <a:extLst>
               <a:ext uri="{FF2B5EF4-FFF2-40B4-BE49-F238E27FC236}">
-                <a16:creationId xmlns:a16="http://schemas.microsoft.com/office/drawing/2014/main" id="{D1ABF561-8E91-4704-BDD7-0520E3848081}"/>
+                <a16:creationId xmlns:a16="http://schemas.microsoft.com/office/drawing/2014/main" xmlns="" id="{D1ABF561-8E91-4704-BDD7-0520E3848081}"/>
               </a:ext>
             </a:extLst>
           </p:cNvPr>
@@ -11717,7 +11758,7 @@
           <p:cNvPr id="12" name="Footer Placeholder 4">
             <a:extLst>
               <a:ext uri="{FF2B5EF4-FFF2-40B4-BE49-F238E27FC236}">
-                <a16:creationId xmlns:a16="http://schemas.microsoft.com/office/drawing/2014/main" id="{0FCAE7D6-4E8F-4930-AF17-B90E0BF188C8}"/>
+                <a16:creationId xmlns:a16="http://schemas.microsoft.com/office/drawing/2014/main" xmlns="" id="{0FCAE7D6-4E8F-4930-AF17-B90E0BF188C8}"/>
               </a:ext>
             </a:extLst>
           </p:cNvPr>
@@ -11847,7 +11888,7 @@
           <p:cNvPr id="15" name="Date Placeholder 3">
             <a:extLst>
               <a:ext uri="{FF2B5EF4-FFF2-40B4-BE49-F238E27FC236}">
-                <a16:creationId xmlns:a16="http://schemas.microsoft.com/office/drawing/2014/main" id="{77041AD4-79DE-43F9-A208-EB6EAD67EC6C}"/>
+                <a16:creationId xmlns:a16="http://schemas.microsoft.com/office/drawing/2014/main" xmlns="" id="{77041AD4-79DE-43F9-A208-EB6EAD67EC6C}"/>
               </a:ext>
             </a:extLst>
           </p:cNvPr>
@@ -11975,7 +12016,7 @@
           <p:cNvPr id="16" name="Date Placeholder 3">
             <a:extLst>
               <a:ext uri="{FF2B5EF4-FFF2-40B4-BE49-F238E27FC236}">
-                <a16:creationId xmlns:a16="http://schemas.microsoft.com/office/drawing/2014/main" id="{FBA8D23F-F274-4824-A7A4-FDEC12A30B65}"/>
+                <a16:creationId xmlns:a16="http://schemas.microsoft.com/office/drawing/2014/main" xmlns="" id="{FBA8D23F-F274-4824-A7A4-FDEC12A30B65}"/>
               </a:ext>
             </a:extLst>
           </p:cNvPr>
@@ -12100,7 +12141,7 @@
           <p:cNvPr id="17" name="Date Placeholder 3">
             <a:extLst>
               <a:ext uri="{FF2B5EF4-FFF2-40B4-BE49-F238E27FC236}">
-                <a16:creationId xmlns:a16="http://schemas.microsoft.com/office/drawing/2014/main" id="{785F7EBD-25C8-4B82-B044-60CAD1D390ED}"/>
+                <a16:creationId xmlns:a16="http://schemas.microsoft.com/office/drawing/2014/main" xmlns="" id="{785F7EBD-25C8-4B82-B044-60CAD1D390ED}"/>
               </a:ext>
             </a:extLst>
           </p:cNvPr>
@@ -12135,7 +12176,7 @@
           <p:cNvPr id="4" name="TextBox 3">
             <a:extLst>
               <a:ext uri="{FF2B5EF4-FFF2-40B4-BE49-F238E27FC236}">
-                <a16:creationId xmlns:a16="http://schemas.microsoft.com/office/drawing/2014/main" id="{202970DE-D595-414E-9AF2-CA0C4A0B09C1}"/>
+                <a16:creationId xmlns:a16="http://schemas.microsoft.com/office/drawing/2014/main" xmlns="" id="{202970DE-D595-414E-9AF2-CA0C4A0B09C1}"/>
               </a:ext>
             </a:extLst>
           </p:cNvPr>
@@ -12502,7 +12543,7 @@
           <p:cNvPr id="11" name="Title 1">
             <a:extLst>
               <a:ext uri="{FF2B5EF4-FFF2-40B4-BE49-F238E27FC236}">
-                <a16:creationId xmlns:a16="http://schemas.microsoft.com/office/drawing/2014/main" id="{DC85129E-0B0B-4C64-B8AF-D549982166EC}"/>
+                <a16:creationId xmlns:a16="http://schemas.microsoft.com/office/drawing/2014/main" xmlns="" id="{DC85129E-0B0B-4C64-B8AF-D549982166EC}"/>
               </a:ext>
             </a:extLst>
           </p:cNvPr>
@@ -12551,7 +12592,7 @@
           <p:cNvPr id="13" name="Footer Placeholder 4">
             <a:extLst>
               <a:ext uri="{FF2B5EF4-FFF2-40B4-BE49-F238E27FC236}">
-                <a16:creationId xmlns:a16="http://schemas.microsoft.com/office/drawing/2014/main" id="{D1ABF561-8E91-4704-BDD7-0520E3848081}"/>
+                <a16:creationId xmlns:a16="http://schemas.microsoft.com/office/drawing/2014/main" xmlns="" id="{D1ABF561-8E91-4704-BDD7-0520E3848081}"/>
               </a:ext>
             </a:extLst>
           </p:cNvPr>
@@ -12589,7 +12630,7 @@
           <p:cNvPr id="12" name="Footer Placeholder 4">
             <a:extLst>
               <a:ext uri="{FF2B5EF4-FFF2-40B4-BE49-F238E27FC236}">
-                <a16:creationId xmlns:a16="http://schemas.microsoft.com/office/drawing/2014/main" id="{C9907D7F-A4E4-4317-AB7D-33136CEA3BBC}"/>
+                <a16:creationId xmlns:a16="http://schemas.microsoft.com/office/drawing/2014/main" xmlns="" id="{C9907D7F-A4E4-4317-AB7D-33136CEA3BBC}"/>
               </a:ext>
             </a:extLst>
           </p:cNvPr>
@@ -12719,7 +12760,7 @@
           <p:cNvPr id="15" name="Date Placeholder 3">
             <a:extLst>
               <a:ext uri="{FF2B5EF4-FFF2-40B4-BE49-F238E27FC236}">
-                <a16:creationId xmlns:a16="http://schemas.microsoft.com/office/drawing/2014/main" id="{B7B8C723-3974-4BCF-9072-3A9695A790BA}"/>
+                <a16:creationId xmlns:a16="http://schemas.microsoft.com/office/drawing/2014/main" xmlns="" id="{B7B8C723-3974-4BCF-9072-3A9695A790BA}"/>
               </a:ext>
             </a:extLst>
           </p:cNvPr>
@@ -12847,7 +12888,7 @@
           <p:cNvPr id="16" name="Date Placeholder 3">
             <a:extLst>
               <a:ext uri="{FF2B5EF4-FFF2-40B4-BE49-F238E27FC236}">
-                <a16:creationId xmlns:a16="http://schemas.microsoft.com/office/drawing/2014/main" id="{652FD19F-EE9E-4D14-9855-225D2D422E60}"/>
+                <a16:creationId xmlns:a16="http://schemas.microsoft.com/office/drawing/2014/main" xmlns="" id="{652FD19F-EE9E-4D14-9855-225D2D422E60}"/>
               </a:ext>
             </a:extLst>
           </p:cNvPr>
@@ -12972,7 +13013,7 @@
           <p:cNvPr id="17" name="Date Placeholder 3">
             <a:extLst>
               <a:ext uri="{FF2B5EF4-FFF2-40B4-BE49-F238E27FC236}">
-                <a16:creationId xmlns:a16="http://schemas.microsoft.com/office/drawing/2014/main" id="{21F69871-FDE9-4D82-9454-7BD29FCF373C}"/>
+                <a16:creationId xmlns:a16="http://schemas.microsoft.com/office/drawing/2014/main" xmlns="" id="{21F69871-FDE9-4D82-9454-7BD29FCF373C}"/>
               </a:ext>
             </a:extLst>
           </p:cNvPr>
@@ -13276,7 +13317,7 @@
           <p:cNvPr id="11" name="Title 1">
             <a:extLst>
               <a:ext uri="{FF2B5EF4-FFF2-40B4-BE49-F238E27FC236}">
-                <a16:creationId xmlns:a16="http://schemas.microsoft.com/office/drawing/2014/main" id="{DC85129E-0B0B-4C64-B8AF-D549982166EC}"/>
+                <a16:creationId xmlns:a16="http://schemas.microsoft.com/office/drawing/2014/main" xmlns="" id="{DC85129E-0B0B-4C64-B8AF-D549982166EC}"/>
               </a:ext>
             </a:extLst>
           </p:cNvPr>
@@ -13325,7 +13366,7 @@
           <p:cNvPr id="13" name="Footer Placeholder 4">
             <a:extLst>
               <a:ext uri="{FF2B5EF4-FFF2-40B4-BE49-F238E27FC236}">
-                <a16:creationId xmlns:a16="http://schemas.microsoft.com/office/drawing/2014/main" id="{D1ABF561-8E91-4704-BDD7-0520E3848081}"/>
+                <a16:creationId xmlns:a16="http://schemas.microsoft.com/office/drawing/2014/main" xmlns="" id="{D1ABF561-8E91-4704-BDD7-0520E3848081}"/>
               </a:ext>
             </a:extLst>
           </p:cNvPr>
@@ -13363,7 +13404,7 @@
           <p:cNvPr id="12" name="Footer Placeholder 4">
             <a:extLst>
               <a:ext uri="{FF2B5EF4-FFF2-40B4-BE49-F238E27FC236}">
-                <a16:creationId xmlns:a16="http://schemas.microsoft.com/office/drawing/2014/main" id="{22DDB47F-B0C3-43E5-97DC-3FD506169118}"/>
+                <a16:creationId xmlns:a16="http://schemas.microsoft.com/office/drawing/2014/main" xmlns="" id="{22DDB47F-B0C3-43E5-97DC-3FD506169118}"/>
               </a:ext>
             </a:extLst>
           </p:cNvPr>
@@ -13493,7 +13534,7 @@
           <p:cNvPr id="15" name="Date Placeholder 3">
             <a:extLst>
               <a:ext uri="{FF2B5EF4-FFF2-40B4-BE49-F238E27FC236}">
-                <a16:creationId xmlns:a16="http://schemas.microsoft.com/office/drawing/2014/main" id="{C2F8AEC7-B9A6-43EA-9088-6C6023104B5A}"/>
+                <a16:creationId xmlns:a16="http://schemas.microsoft.com/office/drawing/2014/main" xmlns="" id="{C2F8AEC7-B9A6-43EA-9088-6C6023104B5A}"/>
               </a:ext>
             </a:extLst>
           </p:cNvPr>
@@ -13621,7 +13662,7 @@
           <p:cNvPr id="16" name="Date Placeholder 3">
             <a:extLst>
               <a:ext uri="{FF2B5EF4-FFF2-40B4-BE49-F238E27FC236}">
-                <a16:creationId xmlns:a16="http://schemas.microsoft.com/office/drawing/2014/main" id="{643FD5BB-27F3-41E7-9911-7B583A1611F8}"/>
+                <a16:creationId xmlns:a16="http://schemas.microsoft.com/office/drawing/2014/main" xmlns="" id="{643FD5BB-27F3-41E7-9911-7B583A1611F8}"/>
               </a:ext>
             </a:extLst>
           </p:cNvPr>
@@ -13746,7 +13787,7 @@
           <p:cNvPr id="17" name="Date Placeholder 3">
             <a:extLst>
               <a:ext uri="{FF2B5EF4-FFF2-40B4-BE49-F238E27FC236}">
-                <a16:creationId xmlns:a16="http://schemas.microsoft.com/office/drawing/2014/main" id="{C68400CB-5F57-4A64-AF41-0F973C1145D7}"/>
+                <a16:creationId xmlns:a16="http://schemas.microsoft.com/office/drawing/2014/main" xmlns="" id="{C68400CB-5F57-4A64-AF41-0F973C1145D7}"/>
               </a:ext>
             </a:extLst>
           </p:cNvPr>
@@ -13811,7 +13852,7 @@
           <p:cNvPr id="2" name="Title 1">
             <a:extLst>
               <a:ext uri="{FF2B5EF4-FFF2-40B4-BE49-F238E27FC236}">
-                <a16:creationId xmlns:a16="http://schemas.microsoft.com/office/drawing/2014/main" id="{D663B1AF-4827-48F8-89C1-04B58CDA00EB}"/>
+                <a16:creationId xmlns:a16="http://schemas.microsoft.com/office/drawing/2014/main" xmlns="" id="{D663B1AF-4827-48F8-89C1-04B58CDA00EB}"/>
               </a:ext>
             </a:extLst>
           </p:cNvPr>
@@ -13859,7 +13900,7 @@
           <p:cNvPr id="3" name="Content Placeholder 2">
             <a:extLst>
               <a:ext uri="{FF2B5EF4-FFF2-40B4-BE49-F238E27FC236}">
-                <a16:creationId xmlns:a16="http://schemas.microsoft.com/office/drawing/2014/main" id="{07D92DB6-6DA7-483C-9605-E091ACCD8173}"/>
+                <a16:creationId xmlns:a16="http://schemas.microsoft.com/office/drawing/2014/main" xmlns="" id="{07D92DB6-6DA7-483C-9605-E091ACCD8173}"/>
               </a:ext>
             </a:extLst>
           </p:cNvPr>
@@ -13982,7 +14023,7 @@
           <p:cNvPr id="4" name="Date Placeholder 3">
             <a:extLst>
               <a:ext uri="{FF2B5EF4-FFF2-40B4-BE49-F238E27FC236}">
-                <a16:creationId xmlns:a16="http://schemas.microsoft.com/office/drawing/2014/main" id="{D257C7DE-82B0-4BFD-ADB2-512C0711F065}"/>
+                <a16:creationId xmlns:a16="http://schemas.microsoft.com/office/drawing/2014/main" xmlns="" id="{D257C7DE-82B0-4BFD-ADB2-512C0711F065}"/>
               </a:ext>
             </a:extLst>
           </p:cNvPr>
@@ -14017,7 +14058,7 @@
           <p:cNvPr id="5" name="Footer Placeholder 4">
             <a:extLst>
               <a:ext uri="{FF2B5EF4-FFF2-40B4-BE49-F238E27FC236}">
-                <a16:creationId xmlns:a16="http://schemas.microsoft.com/office/drawing/2014/main" id="{4453918D-EF15-46E0-A6E8-96CFE8A48E36}"/>
+                <a16:creationId xmlns:a16="http://schemas.microsoft.com/office/drawing/2014/main" xmlns="" id="{4453918D-EF15-46E0-A6E8-96CFE8A48E36}"/>
               </a:ext>
             </a:extLst>
           </p:cNvPr>
@@ -14050,7 +14091,7 @@
           <p:cNvPr id="9" name="Footer Placeholder 4">
             <a:extLst>
               <a:ext uri="{FF2B5EF4-FFF2-40B4-BE49-F238E27FC236}">
-                <a16:creationId xmlns:a16="http://schemas.microsoft.com/office/drawing/2014/main" id="{AF12BD91-D499-484D-AE27-5A29FE3A87B1}"/>
+                <a16:creationId xmlns:a16="http://schemas.microsoft.com/office/drawing/2014/main" xmlns="" id="{AF12BD91-D499-484D-AE27-5A29FE3A87B1}"/>
               </a:ext>
             </a:extLst>
           </p:cNvPr>
@@ -14180,7 +14221,7 @@
           <p:cNvPr id="10" name="Date Placeholder 3">
             <a:extLst>
               <a:ext uri="{FF2B5EF4-FFF2-40B4-BE49-F238E27FC236}">
-                <a16:creationId xmlns:a16="http://schemas.microsoft.com/office/drawing/2014/main" id="{7EAEFA59-ADD5-483B-81EC-7CBC47C157AE}"/>
+                <a16:creationId xmlns:a16="http://schemas.microsoft.com/office/drawing/2014/main" xmlns="" id="{7EAEFA59-ADD5-483B-81EC-7CBC47C157AE}"/>
               </a:ext>
             </a:extLst>
           </p:cNvPr>
@@ -14457,7 +14498,7 @@
           <p:cNvPr id="11" name="Title 1">
             <a:extLst>
               <a:ext uri="{FF2B5EF4-FFF2-40B4-BE49-F238E27FC236}">
-                <a16:creationId xmlns:a16="http://schemas.microsoft.com/office/drawing/2014/main" id="{DC85129E-0B0B-4C64-B8AF-D549982166EC}"/>
+                <a16:creationId xmlns:a16="http://schemas.microsoft.com/office/drawing/2014/main" xmlns="" id="{DC85129E-0B0B-4C64-B8AF-D549982166EC}"/>
               </a:ext>
             </a:extLst>
           </p:cNvPr>
@@ -14506,7 +14547,7 @@
           <p:cNvPr id="13" name="Footer Placeholder 4">
             <a:extLst>
               <a:ext uri="{FF2B5EF4-FFF2-40B4-BE49-F238E27FC236}">
-                <a16:creationId xmlns:a16="http://schemas.microsoft.com/office/drawing/2014/main" id="{D1ABF561-8E91-4704-BDD7-0520E3848081}"/>
+                <a16:creationId xmlns:a16="http://schemas.microsoft.com/office/drawing/2014/main" xmlns="" id="{D1ABF561-8E91-4704-BDD7-0520E3848081}"/>
               </a:ext>
             </a:extLst>
           </p:cNvPr>
@@ -14544,7 +14585,7 @@
           <p:cNvPr id="12" name="Footer Placeholder 4">
             <a:extLst>
               <a:ext uri="{FF2B5EF4-FFF2-40B4-BE49-F238E27FC236}">
-                <a16:creationId xmlns:a16="http://schemas.microsoft.com/office/drawing/2014/main" id="{C7E2142E-82BB-4994-B007-795485F7F8C9}"/>
+                <a16:creationId xmlns:a16="http://schemas.microsoft.com/office/drawing/2014/main" xmlns="" id="{C7E2142E-82BB-4994-B007-795485F7F8C9}"/>
               </a:ext>
             </a:extLst>
           </p:cNvPr>
@@ -14674,7 +14715,7 @@
           <p:cNvPr id="15" name="Date Placeholder 3">
             <a:extLst>
               <a:ext uri="{FF2B5EF4-FFF2-40B4-BE49-F238E27FC236}">
-                <a16:creationId xmlns:a16="http://schemas.microsoft.com/office/drawing/2014/main" id="{F7F1FCB5-A2AF-4B14-B8AB-ACE0D66C9CE6}"/>
+                <a16:creationId xmlns:a16="http://schemas.microsoft.com/office/drawing/2014/main" xmlns="" id="{F7F1FCB5-A2AF-4B14-B8AB-ACE0D66C9CE6}"/>
               </a:ext>
             </a:extLst>
           </p:cNvPr>
@@ -14802,7 +14843,7 @@
           <p:cNvPr id="16" name="Date Placeholder 3">
             <a:extLst>
               <a:ext uri="{FF2B5EF4-FFF2-40B4-BE49-F238E27FC236}">
-                <a16:creationId xmlns:a16="http://schemas.microsoft.com/office/drawing/2014/main" id="{DF6CE105-6C5E-4DE7-A045-FD455A5A989A}"/>
+                <a16:creationId xmlns:a16="http://schemas.microsoft.com/office/drawing/2014/main" xmlns="" id="{DF6CE105-6C5E-4DE7-A045-FD455A5A989A}"/>
               </a:ext>
             </a:extLst>
           </p:cNvPr>
@@ -14927,7 +14968,7 @@
           <p:cNvPr id="17" name="Date Placeholder 3">
             <a:extLst>
               <a:ext uri="{FF2B5EF4-FFF2-40B4-BE49-F238E27FC236}">
-                <a16:creationId xmlns:a16="http://schemas.microsoft.com/office/drawing/2014/main" id="{0DADE530-75F7-4839-81E3-87050A31C961}"/>
+                <a16:creationId xmlns:a16="http://schemas.microsoft.com/office/drawing/2014/main" xmlns="" id="{0DADE530-75F7-4839-81E3-87050A31C961}"/>
               </a:ext>
             </a:extLst>
           </p:cNvPr>
@@ -14962,7 +15003,7 @@
           <p:cNvPr id="5" name="Content Placeholder 4">
             <a:extLst>
               <a:ext uri="{FF2B5EF4-FFF2-40B4-BE49-F238E27FC236}">
-                <a16:creationId xmlns:a16="http://schemas.microsoft.com/office/drawing/2014/main" id="{11AE2190-B4AB-4050-9D30-FFC7B6158DD3}"/>
+                <a16:creationId xmlns:a16="http://schemas.microsoft.com/office/drawing/2014/main" xmlns="" id="{11AE2190-B4AB-4050-9D30-FFC7B6158DD3}"/>
               </a:ext>
             </a:extLst>
           </p:cNvPr>
@@ -15364,7 +15405,7 @@
           <p:cNvPr id="12" name="Footer Placeholder 4">
             <a:extLst>
               <a:ext uri="{FF2B5EF4-FFF2-40B4-BE49-F238E27FC236}">
-                <a16:creationId xmlns:a16="http://schemas.microsoft.com/office/drawing/2014/main" id="{13810B73-4AAA-481B-91C3-62C546016E85}"/>
+                <a16:creationId xmlns:a16="http://schemas.microsoft.com/office/drawing/2014/main" xmlns="" id="{13810B73-4AAA-481B-91C3-62C546016E85}"/>
               </a:ext>
             </a:extLst>
           </p:cNvPr>
@@ -15402,7 +15443,7 @@
           <p:cNvPr id="13" name="Footer Placeholder 4">
             <a:extLst>
               <a:ext uri="{FF2B5EF4-FFF2-40B4-BE49-F238E27FC236}">
-                <a16:creationId xmlns:a16="http://schemas.microsoft.com/office/drawing/2014/main" id="{C568ADF4-CCE8-409D-BC1B-CFC178F5C0EB}"/>
+                <a16:creationId xmlns:a16="http://schemas.microsoft.com/office/drawing/2014/main" xmlns="" id="{C568ADF4-CCE8-409D-BC1B-CFC178F5C0EB}"/>
               </a:ext>
             </a:extLst>
           </p:cNvPr>
@@ -15532,7 +15573,7 @@
           <p:cNvPr id="9" name="Date Placeholder 3">
             <a:extLst>
               <a:ext uri="{FF2B5EF4-FFF2-40B4-BE49-F238E27FC236}">
-                <a16:creationId xmlns:a16="http://schemas.microsoft.com/office/drawing/2014/main" id="{5F72E7FB-5406-40F2-93C2-E9165F64003E}"/>
+                <a16:creationId xmlns:a16="http://schemas.microsoft.com/office/drawing/2014/main" xmlns="" id="{5F72E7FB-5406-40F2-93C2-E9165F64003E}"/>
               </a:ext>
             </a:extLst>
           </p:cNvPr>
@@ -15660,7 +15701,7 @@
           <p:cNvPr id="10" name="Date Placeholder 3">
             <a:extLst>
               <a:ext uri="{FF2B5EF4-FFF2-40B4-BE49-F238E27FC236}">
-                <a16:creationId xmlns:a16="http://schemas.microsoft.com/office/drawing/2014/main" id="{B760CA4A-E789-471D-8EB1-F60022B7FEEE}"/>
+                <a16:creationId xmlns:a16="http://schemas.microsoft.com/office/drawing/2014/main" xmlns="" id="{B760CA4A-E789-471D-8EB1-F60022B7FEEE}"/>
               </a:ext>
             </a:extLst>
           </p:cNvPr>
@@ -15785,7 +15826,7 @@
           <p:cNvPr id="11" name="Date Placeholder 3">
             <a:extLst>
               <a:ext uri="{FF2B5EF4-FFF2-40B4-BE49-F238E27FC236}">
-                <a16:creationId xmlns:a16="http://schemas.microsoft.com/office/drawing/2014/main" id="{BA45694C-EE57-46E3-94BB-26F02AD1A1E2}"/>
+                <a16:creationId xmlns:a16="http://schemas.microsoft.com/office/drawing/2014/main" xmlns="" id="{BA45694C-EE57-46E3-94BB-26F02AD1A1E2}"/>
               </a:ext>
             </a:extLst>
           </p:cNvPr>
@@ -16092,7 +16133,7 @@
           <p:cNvPr id="11" name="Title 1">
             <a:extLst>
               <a:ext uri="{FF2B5EF4-FFF2-40B4-BE49-F238E27FC236}">
-                <a16:creationId xmlns:a16="http://schemas.microsoft.com/office/drawing/2014/main" id="{DC85129E-0B0B-4C64-B8AF-D549982166EC}"/>
+                <a16:creationId xmlns:a16="http://schemas.microsoft.com/office/drawing/2014/main" xmlns="" id="{DC85129E-0B0B-4C64-B8AF-D549982166EC}"/>
               </a:ext>
             </a:extLst>
           </p:cNvPr>
@@ -16141,7 +16182,7 @@
           <p:cNvPr id="13" name="Footer Placeholder 4">
             <a:extLst>
               <a:ext uri="{FF2B5EF4-FFF2-40B4-BE49-F238E27FC236}">
-                <a16:creationId xmlns:a16="http://schemas.microsoft.com/office/drawing/2014/main" id="{D1ABF561-8E91-4704-BDD7-0520E3848081}"/>
+                <a16:creationId xmlns:a16="http://schemas.microsoft.com/office/drawing/2014/main" xmlns="" id="{D1ABF561-8E91-4704-BDD7-0520E3848081}"/>
               </a:ext>
             </a:extLst>
           </p:cNvPr>
@@ -16179,7 +16220,7 @@
           <p:cNvPr id="19" name="Date Placeholder 3">
             <a:extLst>
               <a:ext uri="{FF2B5EF4-FFF2-40B4-BE49-F238E27FC236}">
-                <a16:creationId xmlns:a16="http://schemas.microsoft.com/office/drawing/2014/main" id="{DEE9A254-D57A-4AC6-8925-0BE9E07DD752}"/>
+                <a16:creationId xmlns:a16="http://schemas.microsoft.com/office/drawing/2014/main" xmlns="" id="{DEE9A254-D57A-4AC6-8925-0BE9E07DD752}"/>
               </a:ext>
             </a:extLst>
           </p:cNvPr>
@@ -16307,7 +16348,7 @@
           <p:cNvPr id="20" name="Date Placeholder 3">
             <a:extLst>
               <a:ext uri="{FF2B5EF4-FFF2-40B4-BE49-F238E27FC236}">
-                <a16:creationId xmlns:a16="http://schemas.microsoft.com/office/drawing/2014/main" id="{F640DC25-A5F0-4C43-B238-F57EF831767B}"/>
+                <a16:creationId xmlns:a16="http://schemas.microsoft.com/office/drawing/2014/main" xmlns="" id="{F640DC25-A5F0-4C43-B238-F57EF831767B}"/>
               </a:ext>
             </a:extLst>
           </p:cNvPr>
@@ -16432,7 +16473,7 @@
           <p:cNvPr id="21" name="Date Placeholder 3">
             <a:extLst>
               <a:ext uri="{FF2B5EF4-FFF2-40B4-BE49-F238E27FC236}">
-                <a16:creationId xmlns:a16="http://schemas.microsoft.com/office/drawing/2014/main" id="{D926DBC5-06FC-4DCF-9A9C-2AB9CF31099C}"/>
+                <a16:creationId xmlns:a16="http://schemas.microsoft.com/office/drawing/2014/main" xmlns="" id="{D926DBC5-06FC-4DCF-9A9C-2AB9CF31099C}"/>
               </a:ext>
             </a:extLst>
           </p:cNvPr>
@@ -16709,7 +16750,7 @@
           <p:cNvPr id="11" name="Title 1">
             <a:extLst>
               <a:ext uri="{FF2B5EF4-FFF2-40B4-BE49-F238E27FC236}">
-                <a16:creationId xmlns:a16="http://schemas.microsoft.com/office/drawing/2014/main" id="{DC85129E-0B0B-4C64-B8AF-D549982166EC}"/>
+                <a16:creationId xmlns:a16="http://schemas.microsoft.com/office/drawing/2014/main" xmlns="" id="{DC85129E-0B0B-4C64-B8AF-D549982166EC}"/>
               </a:ext>
             </a:extLst>
           </p:cNvPr>
@@ -16758,7 +16799,7 @@
           <p:cNvPr id="13" name="Footer Placeholder 4">
             <a:extLst>
               <a:ext uri="{FF2B5EF4-FFF2-40B4-BE49-F238E27FC236}">
-                <a16:creationId xmlns:a16="http://schemas.microsoft.com/office/drawing/2014/main" id="{D1ABF561-8E91-4704-BDD7-0520E3848081}"/>
+                <a16:creationId xmlns:a16="http://schemas.microsoft.com/office/drawing/2014/main" xmlns="" id="{D1ABF561-8E91-4704-BDD7-0520E3848081}"/>
               </a:ext>
             </a:extLst>
           </p:cNvPr>
@@ -16796,7 +16837,7 @@
           <p:cNvPr id="19" name="Date Placeholder 3">
             <a:extLst>
               <a:ext uri="{FF2B5EF4-FFF2-40B4-BE49-F238E27FC236}">
-                <a16:creationId xmlns:a16="http://schemas.microsoft.com/office/drawing/2014/main" id="{DEE9A254-D57A-4AC6-8925-0BE9E07DD752}"/>
+                <a16:creationId xmlns:a16="http://schemas.microsoft.com/office/drawing/2014/main" xmlns="" id="{DEE9A254-D57A-4AC6-8925-0BE9E07DD752}"/>
               </a:ext>
             </a:extLst>
           </p:cNvPr>
@@ -16924,7 +16965,7 @@
           <p:cNvPr id="20" name="Date Placeholder 3">
             <a:extLst>
               <a:ext uri="{FF2B5EF4-FFF2-40B4-BE49-F238E27FC236}">
-                <a16:creationId xmlns:a16="http://schemas.microsoft.com/office/drawing/2014/main" id="{F640DC25-A5F0-4C43-B238-F57EF831767B}"/>
+                <a16:creationId xmlns:a16="http://schemas.microsoft.com/office/drawing/2014/main" xmlns="" id="{F640DC25-A5F0-4C43-B238-F57EF831767B}"/>
               </a:ext>
             </a:extLst>
           </p:cNvPr>
@@ -17049,7 +17090,7 @@
           <p:cNvPr id="21" name="Date Placeholder 3">
             <a:extLst>
               <a:ext uri="{FF2B5EF4-FFF2-40B4-BE49-F238E27FC236}">
-                <a16:creationId xmlns:a16="http://schemas.microsoft.com/office/drawing/2014/main" id="{D926DBC5-06FC-4DCF-9A9C-2AB9CF31099C}"/>
+                <a16:creationId xmlns:a16="http://schemas.microsoft.com/office/drawing/2014/main" xmlns="" id="{D926DBC5-06FC-4DCF-9A9C-2AB9CF31099C}"/>
               </a:ext>
             </a:extLst>
           </p:cNvPr>
@@ -17329,7 +17370,7 @@
           <p:cNvPr id="11" name="Title 1">
             <a:extLst>
               <a:ext uri="{FF2B5EF4-FFF2-40B4-BE49-F238E27FC236}">
-                <a16:creationId xmlns:a16="http://schemas.microsoft.com/office/drawing/2014/main" id="{DC85129E-0B0B-4C64-B8AF-D549982166EC}"/>
+                <a16:creationId xmlns:a16="http://schemas.microsoft.com/office/drawing/2014/main" xmlns="" id="{DC85129E-0B0B-4C64-B8AF-D549982166EC}"/>
               </a:ext>
             </a:extLst>
           </p:cNvPr>
@@ -17378,7 +17419,7 @@
           <p:cNvPr id="13" name="Footer Placeholder 4">
             <a:extLst>
               <a:ext uri="{FF2B5EF4-FFF2-40B4-BE49-F238E27FC236}">
-                <a16:creationId xmlns:a16="http://schemas.microsoft.com/office/drawing/2014/main" id="{D1ABF561-8E91-4704-BDD7-0520E3848081}"/>
+                <a16:creationId xmlns:a16="http://schemas.microsoft.com/office/drawing/2014/main" xmlns="" id="{D1ABF561-8E91-4704-BDD7-0520E3848081}"/>
               </a:ext>
             </a:extLst>
           </p:cNvPr>
@@ -17416,7 +17457,7 @@
           <p:cNvPr id="19" name="Date Placeholder 3">
             <a:extLst>
               <a:ext uri="{FF2B5EF4-FFF2-40B4-BE49-F238E27FC236}">
-                <a16:creationId xmlns:a16="http://schemas.microsoft.com/office/drawing/2014/main" id="{DEE9A254-D57A-4AC6-8925-0BE9E07DD752}"/>
+                <a16:creationId xmlns:a16="http://schemas.microsoft.com/office/drawing/2014/main" xmlns="" id="{DEE9A254-D57A-4AC6-8925-0BE9E07DD752}"/>
               </a:ext>
             </a:extLst>
           </p:cNvPr>
@@ -17544,7 +17585,7 @@
           <p:cNvPr id="20" name="Date Placeholder 3">
             <a:extLst>
               <a:ext uri="{FF2B5EF4-FFF2-40B4-BE49-F238E27FC236}">
-                <a16:creationId xmlns:a16="http://schemas.microsoft.com/office/drawing/2014/main" id="{F640DC25-A5F0-4C43-B238-F57EF831767B}"/>
+                <a16:creationId xmlns:a16="http://schemas.microsoft.com/office/drawing/2014/main" xmlns="" id="{F640DC25-A5F0-4C43-B238-F57EF831767B}"/>
               </a:ext>
             </a:extLst>
           </p:cNvPr>
@@ -17669,7 +17710,7 @@
           <p:cNvPr id="21" name="Date Placeholder 3">
             <a:extLst>
               <a:ext uri="{FF2B5EF4-FFF2-40B4-BE49-F238E27FC236}">
-                <a16:creationId xmlns:a16="http://schemas.microsoft.com/office/drawing/2014/main" id="{D926DBC5-06FC-4DCF-9A9C-2AB9CF31099C}"/>
+                <a16:creationId xmlns:a16="http://schemas.microsoft.com/office/drawing/2014/main" xmlns="" id="{D926DBC5-06FC-4DCF-9A9C-2AB9CF31099C}"/>
               </a:ext>
             </a:extLst>
           </p:cNvPr>
@@ -18036,7 +18077,7 @@
           <p:cNvPr id="11" name="Title 1">
             <a:extLst>
               <a:ext uri="{FF2B5EF4-FFF2-40B4-BE49-F238E27FC236}">
-                <a16:creationId xmlns:a16="http://schemas.microsoft.com/office/drawing/2014/main" id="{DC85129E-0B0B-4C64-B8AF-D549982166EC}"/>
+                <a16:creationId xmlns:a16="http://schemas.microsoft.com/office/drawing/2014/main" xmlns="" id="{DC85129E-0B0B-4C64-B8AF-D549982166EC}"/>
               </a:ext>
             </a:extLst>
           </p:cNvPr>
@@ -18085,7 +18126,7 @@
           <p:cNvPr id="13" name="Footer Placeholder 4">
             <a:extLst>
               <a:ext uri="{FF2B5EF4-FFF2-40B4-BE49-F238E27FC236}">
-                <a16:creationId xmlns:a16="http://schemas.microsoft.com/office/drawing/2014/main" id="{D1ABF561-8E91-4704-BDD7-0520E3848081}"/>
+                <a16:creationId xmlns:a16="http://schemas.microsoft.com/office/drawing/2014/main" xmlns="" id="{D1ABF561-8E91-4704-BDD7-0520E3848081}"/>
               </a:ext>
             </a:extLst>
           </p:cNvPr>
@@ -18123,7 +18164,7 @@
           <p:cNvPr id="12" name="Date Placeholder 3">
             <a:extLst>
               <a:ext uri="{FF2B5EF4-FFF2-40B4-BE49-F238E27FC236}">
-                <a16:creationId xmlns:a16="http://schemas.microsoft.com/office/drawing/2014/main" id="{4C87E07D-04F0-4FD7-BADA-185BE6E40376}"/>
+                <a16:creationId xmlns:a16="http://schemas.microsoft.com/office/drawing/2014/main" xmlns="" id="{4C87E07D-04F0-4FD7-BADA-185BE6E40376}"/>
               </a:ext>
             </a:extLst>
           </p:cNvPr>
@@ -18251,7 +18292,7 @@
           <p:cNvPr id="15" name="Date Placeholder 3">
             <a:extLst>
               <a:ext uri="{FF2B5EF4-FFF2-40B4-BE49-F238E27FC236}">
-                <a16:creationId xmlns:a16="http://schemas.microsoft.com/office/drawing/2014/main" id="{8F8AD2AF-87AA-4D60-AD51-74B756F5A4EF}"/>
+                <a16:creationId xmlns:a16="http://schemas.microsoft.com/office/drawing/2014/main" xmlns="" id="{8F8AD2AF-87AA-4D60-AD51-74B756F5A4EF}"/>
               </a:ext>
             </a:extLst>
           </p:cNvPr>
@@ -18376,7 +18417,7 @@
           <p:cNvPr id="16" name="Date Placeholder 3">
             <a:extLst>
               <a:ext uri="{FF2B5EF4-FFF2-40B4-BE49-F238E27FC236}">
-                <a16:creationId xmlns:a16="http://schemas.microsoft.com/office/drawing/2014/main" id="{EA71D549-53A9-4DDC-AFAF-782E92655F4D}"/>
+                <a16:creationId xmlns:a16="http://schemas.microsoft.com/office/drawing/2014/main" xmlns="" id="{EA71D549-53A9-4DDC-AFAF-782E92655F4D}"/>
               </a:ext>
             </a:extLst>
           </p:cNvPr>
@@ -18784,7 +18825,7 @@
           <p:cNvPr id="11" name="Title 1">
             <a:extLst>
               <a:ext uri="{FF2B5EF4-FFF2-40B4-BE49-F238E27FC236}">
-                <a16:creationId xmlns:a16="http://schemas.microsoft.com/office/drawing/2014/main" id="{DC85129E-0B0B-4C64-B8AF-D549982166EC}"/>
+                <a16:creationId xmlns:a16="http://schemas.microsoft.com/office/drawing/2014/main" xmlns="" id="{DC85129E-0B0B-4C64-B8AF-D549982166EC}"/>
               </a:ext>
             </a:extLst>
           </p:cNvPr>
@@ -18833,7 +18874,7 @@
           <p:cNvPr id="13" name="Footer Placeholder 4">
             <a:extLst>
               <a:ext uri="{FF2B5EF4-FFF2-40B4-BE49-F238E27FC236}">
-                <a16:creationId xmlns:a16="http://schemas.microsoft.com/office/drawing/2014/main" id="{D1ABF561-8E91-4704-BDD7-0520E3848081}"/>
+                <a16:creationId xmlns:a16="http://schemas.microsoft.com/office/drawing/2014/main" xmlns="" id="{D1ABF561-8E91-4704-BDD7-0520E3848081}"/>
               </a:ext>
             </a:extLst>
           </p:cNvPr>
@@ -18871,7 +18912,7 @@
           <p:cNvPr id="12" name="Date Placeholder 3">
             <a:extLst>
               <a:ext uri="{FF2B5EF4-FFF2-40B4-BE49-F238E27FC236}">
-                <a16:creationId xmlns:a16="http://schemas.microsoft.com/office/drawing/2014/main" id="{4C87E07D-04F0-4FD7-BADA-185BE6E40376}"/>
+                <a16:creationId xmlns:a16="http://schemas.microsoft.com/office/drawing/2014/main" xmlns="" id="{4C87E07D-04F0-4FD7-BADA-185BE6E40376}"/>
               </a:ext>
             </a:extLst>
           </p:cNvPr>
@@ -18999,7 +19040,7 @@
           <p:cNvPr id="15" name="Date Placeholder 3">
             <a:extLst>
               <a:ext uri="{FF2B5EF4-FFF2-40B4-BE49-F238E27FC236}">
-                <a16:creationId xmlns:a16="http://schemas.microsoft.com/office/drawing/2014/main" id="{8F8AD2AF-87AA-4D60-AD51-74B756F5A4EF}"/>
+                <a16:creationId xmlns:a16="http://schemas.microsoft.com/office/drawing/2014/main" xmlns="" id="{8F8AD2AF-87AA-4D60-AD51-74B756F5A4EF}"/>
               </a:ext>
             </a:extLst>
           </p:cNvPr>
@@ -19124,7 +19165,7 @@
           <p:cNvPr id="16" name="Date Placeholder 3">
             <a:extLst>
               <a:ext uri="{FF2B5EF4-FFF2-40B4-BE49-F238E27FC236}">
-                <a16:creationId xmlns:a16="http://schemas.microsoft.com/office/drawing/2014/main" id="{EA71D549-53A9-4DDC-AFAF-782E92655F4D}"/>
+                <a16:creationId xmlns:a16="http://schemas.microsoft.com/office/drawing/2014/main" xmlns="" id="{EA71D549-53A9-4DDC-AFAF-782E92655F4D}"/>
               </a:ext>
             </a:extLst>
           </p:cNvPr>
@@ -19513,7 +19554,7 @@
           <p:cNvPr id="11" name="Title 1">
             <a:extLst>
               <a:ext uri="{FF2B5EF4-FFF2-40B4-BE49-F238E27FC236}">
-                <a16:creationId xmlns:a16="http://schemas.microsoft.com/office/drawing/2014/main" id="{DC85129E-0B0B-4C64-B8AF-D549982166EC}"/>
+                <a16:creationId xmlns:a16="http://schemas.microsoft.com/office/drawing/2014/main" xmlns="" id="{DC85129E-0B0B-4C64-B8AF-D549982166EC}"/>
               </a:ext>
             </a:extLst>
           </p:cNvPr>
@@ -19562,7 +19603,7 @@
           <p:cNvPr id="13" name="Footer Placeholder 4">
             <a:extLst>
               <a:ext uri="{FF2B5EF4-FFF2-40B4-BE49-F238E27FC236}">
-                <a16:creationId xmlns:a16="http://schemas.microsoft.com/office/drawing/2014/main" id="{D1ABF561-8E91-4704-BDD7-0520E3848081}"/>
+                <a16:creationId xmlns:a16="http://schemas.microsoft.com/office/drawing/2014/main" xmlns="" id="{D1ABF561-8E91-4704-BDD7-0520E3848081}"/>
               </a:ext>
             </a:extLst>
           </p:cNvPr>
@@ -19600,7 +19641,7 @@
           <p:cNvPr id="12" name="Date Placeholder 3">
             <a:extLst>
               <a:ext uri="{FF2B5EF4-FFF2-40B4-BE49-F238E27FC236}">
-                <a16:creationId xmlns:a16="http://schemas.microsoft.com/office/drawing/2014/main" id="{4C87E07D-04F0-4FD7-BADA-185BE6E40376}"/>
+                <a16:creationId xmlns:a16="http://schemas.microsoft.com/office/drawing/2014/main" xmlns="" id="{4C87E07D-04F0-4FD7-BADA-185BE6E40376}"/>
               </a:ext>
             </a:extLst>
           </p:cNvPr>
@@ -19728,7 +19769,7 @@
           <p:cNvPr id="15" name="Date Placeholder 3">
             <a:extLst>
               <a:ext uri="{FF2B5EF4-FFF2-40B4-BE49-F238E27FC236}">
-                <a16:creationId xmlns:a16="http://schemas.microsoft.com/office/drawing/2014/main" id="{8F8AD2AF-87AA-4D60-AD51-74B756F5A4EF}"/>
+                <a16:creationId xmlns:a16="http://schemas.microsoft.com/office/drawing/2014/main" xmlns="" id="{8F8AD2AF-87AA-4D60-AD51-74B756F5A4EF}"/>
               </a:ext>
             </a:extLst>
           </p:cNvPr>
@@ -19853,7 +19894,7 @@
           <p:cNvPr id="16" name="Date Placeholder 3">
             <a:extLst>
               <a:ext uri="{FF2B5EF4-FFF2-40B4-BE49-F238E27FC236}">
-                <a16:creationId xmlns:a16="http://schemas.microsoft.com/office/drawing/2014/main" id="{EA71D549-53A9-4DDC-AFAF-782E92655F4D}"/>
+                <a16:creationId xmlns:a16="http://schemas.microsoft.com/office/drawing/2014/main" xmlns="" id="{EA71D549-53A9-4DDC-AFAF-782E92655F4D}"/>
               </a:ext>
             </a:extLst>
           </p:cNvPr>
@@ -20270,7 +20311,7 @@
           <p:cNvPr id="11" name="Title 1">
             <a:extLst>
               <a:ext uri="{FF2B5EF4-FFF2-40B4-BE49-F238E27FC236}">
-                <a16:creationId xmlns:a16="http://schemas.microsoft.com/office/drawing/2014/main" id="{DC85129E-0B0B-4C64-B8AF-D549982166EC}"/>
+                <a16:creationId xmlns:a16="http://schemas.microsoft.com/office/drawing/2014/main" xmlns="" id="{DC85129E-0B0B-4C64-B8AF-D549982166EC}"/>
               </a:ext>
             </a:extLst>
           </p:cNvPr>
@@ -20319,7 +20360,7 @@
           <p:cNvPr id="13" name="Footer Placeholder 4">
             <a:extLst>
               <a:ext uri="{FF2B5EF4-FFF2-40B4-BE49-F238E27FC236}">
-                <a16:creationId xmlns:a16="http://schemas.microsoft.com/office/drawing/2014/main" id="{D1ABF561-8E91-4704-BDD7-0520E3848081}"/>
+                <a16:creationId xmlns:a16="http://schemas.microsoft.com/office/drawing/2014/main" xmlns="" id="{D1ABF561-8E91-4704-BDD7-0520E3848081}"/>
               </a:ext>
             </a:extLst>
           </p:cNvPr>
@@ -20357,7 +20398,7 @@
           <p:cNvPr id="12" name="Date Placeholder 3">
             <a:extLst>
               <a:ext uri="{FF2B5EF4-FFF2-40B4-BE49-F238E27FC236}">
-                <a16:creationId xmlns:a16="http://schemas.microsoft.com/office/drawing/2014/main" id="{54B6F2D0-7DB8-46A8-BE38-9A76D2B8158B}"/>
+                <a16:creationId xmlns:a16="http://schemas.microsoft.com/office/drawing/2014/main" xmlns="" id="{54B6F2D0-7DB8-46A8-BE38-9A76D2B8158B}"/>
               </a:ext>
             </a:extLst>
           </p:cNvPr>
@@ -20485,7 +20526,7 @@
           <p:cNvPr id="15" name="Date Placeholder 3">
             <a:extLst>
               <a:ext uri="{FF2B5EF4-FFF2-40B4-BE49-F238E27FC236}">
-                <a16:creationId xmlns:a16="http://schemas.microsoft.com/office/drawing/2014/main" id="{7776AD0D-19A8-414D-80CE-F20CD3193C15}"/>
+                <a16:creationId xmlns:a16="http://schemas.microsoft.com/office/drawing/2014/main" xmlns="" id="{7776AD0D-19A8-414D-80CE-F20CD3193C15}"/>
               </a:ext>
             </a:extLst>
           </p:cNvPr>
@@ -20610,7 +20651,7 @@
           <p:cNvPr id="16" name="Date Placeholder 3">
             <a:extLst>
               <a:ext uri="{FF2B5EF4-FFF2-40B4-BE49-F238E27FC236}">
-                <a16:creationId xmlns:a16="http://schemas.microsoft.com/office/drawing/2014/main" id="{2135CCC7-8B9E-459F-BB5B-78E5BAC4A86B}"/>
+                <a16:creationId xmlns:a16="http://schemas.microsoft.com/office/drawing/2014/main" xmlns="" id="{2135CCC7-8B9E-459F-BB5B-78E5BAC4A86B}"/>
               </a:ext>
             </a:extLst>
           </p:cNvPr>

</xml_diff>